<commit_message>
added some material on GANs and a simple lab with keras
</commit_message>
<xml_diff>
--- a/day1/Agenda.pptx
+++ b/day1/Agenda.pptx
@@ -7,6 +7,7 @@
   <p:sldIdLst>
     <p:sldId id="256" r:id="rId2"/>
     <p:sldId id="257" r:id="rId3"/>
+    <p:sldId id="258" r:id="rId4"/>
   </p:sldIdLst>
   <p:sldSz cx="12192000" cy="6858000"/>
   <p:notesSz cx="6858000" cy="9144000"/>
@@ -105,6 +106,11 @@
       </a:defRPr>
     </a:lvl9pPr>
   </p:defaultTextStyle>
+  <p:extLst>
+    <p:ext uri="{EFAFB233-063F-42B5-8137-9DF3F51BA10A}">
+      <p15:sldGuideLst xmlns:p15="http://schemas.microsoft.com/office/powerpoint/2012/main"/>
+    </p:ext>
+  </p:extLst>
 </p:presentation>
 </file>
 
@@ -255,7 +261,7 @@
           <a:p>
             <a:fld id="{DEC8558D-7E10-584E-BEE2-BF9C0EA4F725}" type="datetimeFigureOut">
               <a:rPr lang="en-US" smtClean="0"/>
-              <a:t>5/12/18</a:t>
+              <a:t>5/13/18</a:t>
             </a:fld>
             <a:endParaRPr lang="en-US"/>
           </a:p>
@@ -453,7 +459,7 @@
           <a:p>
             <a:fld id="{DEC8558D-7E10-584E-BEE2-BF9C0EA4F725}" type="datetimeFigureOut">
               <a:rPr lang="en-US" smtClean="0"/>
-              <a:t>5/12/18</a:t>
+              <a:t>5/13/18</a:t>
             </a:fld>
             <a:endParaRPr lang="en-US"/>
           </a:p>
@@ -661,7 +667,7 @@
           <a:p>
             <a:fld id="{DEC8558D-7E10-584E-BEE2-BF9C0EA4F725}" type="datetimeFigureOut">
               <a:rPr lang="en-US" smtClean="0"/>
-              <a:t>5/12/18</a:t>
+              <a:t>5/13/18</a:t>
             </a:fld>
             <a:endParaRPr lang="en-US"/>
           </a:p>
@@ -859,7 +865,7 @@
           <a:p>
             <a:fld id="{DEC8558D-7E10-584E-BEE2-BF9C0EA4F725}" type="datetimeFigureOut">
               <a:rPr lang="en-US" smtClean="0"/>
-              <a:t>5/12/18</a:t>
+              <a:t>5/13/18</a:t>
             </a:fld>
             <a:endParaRPr lang="en-US"/>
           </a:p>
@@ -1134,7 +1140,7 @@
           <a:p>
             <a:fld id="{DEC8558D-7E10-584E-BEE2-BF9C0EA4F725}" type="datetimeFigureOut">
               <a:rPr lang="en-US" smtClean="0"/>
-              <a:t>5/12/18</a:t>
+              <a:t>5/13/18</a:t>
             </a:fld>
             <a:endParaRPr lang="en-US"/>
           </a:p>
@@ -1399,7 +1405,7 @@
           <a:p>
             <a:fld id="{DEC8558D-7E10-584E-BEE2-BF9C0EA4F725}" type="datetimeFigureOut">
               <a:rPr lang="en-US" smtClean="0"/>
-              <a:t>5/12/18</a:t>
+              <a:t>5/13/18</a:t>
             </a:fld>
             <a:endParaRPr lang="en-US"/>
           </a:p>
@@ -1811,7 +1817,7 @@
           <a:p>
             <a:fld id="{DEC8558D-7E10-584E-BEE2-BF9C0EA4F725}" type="datetimeFigureOut">
               <a:rPr lang="en-US" smtClean="0"/>
-              <a:t>5/12/18</a:t>
+              <a:t>5/13/18</a:t>
             </a:fld>
             <a:endParaRPr lang="en-US"/>
           </a:p>
@@ -1952,7 +1958,7 @@
           <a:p>
             <a:fld id="{DEC8558D-7E10-584E-BEE2-BF9C0EA4F725}" type="datetimeFigureOut">
               <a:rPr lang="en-US" smtClean="0"/>
-              <a:t>5/12/18</a:t>
+              <a:t>5/13/18</a:t>
             </a:fld>
             <a:endParaRPr lang="en-US"/>
           </a:p>
@@ -2065,7 +2071,7 @@
           <a:p>
             <a:fld id="{DEC8558D-7E10-584E-BEE2-BF9C0EA4F725}" type="datetimeFigureOut">
               <a:rPr lang="en-US" smtClean="0"/>
-              <a:t>5/12/18</a:t>
+              <a:t>5/13/18</a:t>
             </a:fld>
             <a:endParaRPr lang="en-US"/>
           </a:p>
@@ -2376,7 +2382,7 @@
           <a:p>
             <a:fld id="{DEC8558D-7E10-584E-BEE2-BF9C0EA4F725}" type="datetimeFigureOut">
               <a:rPr lang="en-US" smtClean="0"/>
-              <a:t>5/12/18</a:t>
+              <a:t>5/13/18</a:t>
             </a:fld>
             <a:endParaRPr lang="en-US"/>
           </a:p>
@@ -2664,7 +2670,7 @@
           <a:p>
             <a:fld id="{DEC8558D-7E10-584E-BEE2-BF9C0EA4F725}" type="datetimeFigureOut">
               <a:rPr lang="en-US" smtClean="0"/>
-              <a:t>5/12/18</a:t>
+              <a:t>5/13/18</a:t>
             </a:fld>
             <a:endParaRPr lang="en-US"/>
           </a:p>
@@ -2905,7 +2911,7 @@
           <a:p>
             <a:fld id="{DEC8558D-7E10-584E-BEE2-BF9C0EA4F725}" type="datetimeFigureOut">
               <a:rPr lang="en-US" smtClean="0"/>
-              <a:t>5/12/18</a:t>
+              <a:t>5/13/18</a:t>
             </a:fld>
             <a:endParaRPr lang="en-US"/>
           </a:p>
@@ -3474,7 +3480,7 @@
         </p:spPr>
         <p:txBody>
           <a:bodyPr>
-            <a:normAutofit fontScale="55000" lnSpcReduction="20000"/>
+            <a:normAutofit fontScale="62500" lnSpcReduction="20000"/>
           </a:bodyPr>
           <a:lstStyle/>
           <a:p>
@@ -3688,40 +3694,20 @@
         </p:spPr>
         <p:txBody>
           <a:bodyPr>
-            <a:normAutofit fontScale="55000" lnSpcReduction="20000"/>
+            <a:normAutofit fontScale="62500" lnSpcReduction="20000"/>
           </a:bodyPr>
           <a:lstStyle/>
           <a:p>
             <a:r>
               <a:rPr lang="en-US" sz="2900" dirty="0"/>
-              <a:t>Day 3: focus on operations and leave time for other interesting labs and topics</a:t>
+              <a:t>Day 3: </a:t>
             </a:r>
           </a:p>
           <a:p>
             <a:pPr lvl="1"/>
             <a:r>
               <a:rPr lang="en-US" sz="2600" dirty="0"/>
-              <a:t>Deployment of models using containers - </a:t>
-            </a:r>
-            <a:r>
-              <a:rPr lang="en-US" sz="2600" dirty="0">
-                <a:hlinkClick r:id="rId2"/>
-              </a:rPr>
-              <a:t>@Sanjeev Dwivedi</a:t>
-            </a:r>
-            <a:r>
-              <a:rPr lang="en-US" sz="2600" dirty="0"/>
-              <a:t>, </a:t>
-            </a:r>
-            <a:r>
-              <a:rPr lang="en-US" sz="2600" dirty="0">
-                <a:hlinkClick r:id="rId3"/>
-              </a:rPr>
-              <a:t>@Prashant Karbhari</a:t>
-            </a:r>
-            <a:r>
-              <a:rPr lang="en-US" sz="2600" dirty="0"/>
-              <a:t> you are the only ones who cracked this so far. Are you still up for presenting / demoing? Do you have time to write a lab?</a:t>
+              <a:t>Deployment of models using containers</a:t>
             </a:r>
           </a:p>
           <a:p>
@@ -3734,10 +3720,7 @@
               <a:rPr lang="en-US" sz="2600" dirty="0" err="1"/>
               <a:t>MLServer</a:t>
             </a:r>
-            <a:r>
-              <a:rPr lang="en-US" sz="2600" dirty="0"/>
-              <a:t> – GM to write</a:t>
-            </a:r>
+            <a:endParaRPr lang="en-US" sz="2600" dirty="0"/>
           </a:p>
           <a:p>
             <a:pPr lvl="1"/>
@@ -3745,24 +3728,6 @@
               <a:rPr lang="en-US" sz="2600" dirty="0"/>
               <a:t>Introduction to cognitive services </a:t>
             </a:r>
-            <a:r>
-              <a:rPr lang="en-US" sz="2600" dirty="0">
-                <a:hlinkClick r:id="rId3"/>
-              </a:rPr>
-              <a:t>@Prashant Karbhari</a:t>
-            </a:r>
-            <a:r>
-              <a:rPr lang="en-US" sz="2600" dirty="0"/>
-              <a:t> are you still interested in presenting this and offering some code samples? We’ve just announced </a:t>
-            </a:r>
-            <a:r>
-              <a:rPr lang="en-US" sz="2600" dirty="0" err="1"/>
-              <a:t>bing</a:t>
-            </a:r>
-            <a:r>
-              <a:rPr lang="en-US" sz="2600" dirty="0"/>
-              <a:t> visual search. A quick demo would be cool, but I have not looked into it yet</a:t>
-            </a:r>
           </a:p>
           <a:p>
             <a:pPr lvl="1"/>
@@ -3790,35 +3755,28 @@
             <a:pPr lvl="2"/>
             <a:r>
               <a:rPr lang="en-US" sz="2200" dirty="0"/>
-              <a:t> Generative Antagonistic Networks (lab)</a:t>
+              <a:t>Generative Antagonistic Networks (lab)</a:t>
             </a:r>
           </a:p>
           <a:p>
             <a:pPr lvl="2"/>
             <a:r>
               <a:rPr lang="en-US" sz="2200" dirty="0"/>
-              <a:t>recommendation with autoencoders – GM to write</a:t>
+              <a:t>Recommendation with autoencoders </a:t>
             </a:r>
           </a:p>
           <a:p>
             <a:pPr lvl="2"/>
             <a:r>
               <a:rPr lang="en-US" sz="2200" dirty="0"/>
-              <a:t>visual search with CNNs and cosine vs. Euclidean distance – GM to write</a:t>
+              <a:t>Visual search with CNNs and cosine vs. Euclidean distance </a:t>
             </a:r>
           </a:p>
           <a:p>
             <a:pPr lvl="2"/>
             <a:r>
               <a:rPr lang="en-US" sz="2200" dirty="0"/>
-              <a:t>time series forecasting with RNNs – GM to write</a:t>
-            </a:r>
-          </a:p>
-          <a:p>
-            <a:pPr lvl="2"/>
-            <a:r>
-              <a:rPr lang="en-US" sz="2200" dirty="0"/>
-              <a:t> Any other idea you’d like to present?</a:t>
+              <a:t>Time series forecasting with RNNs</a:t>
             </a:r>
           </a:p>
           <a:p>
@@ -3834,6 +3792,149 @@
     <p:extLst>
       <p:ext uri="{BB962C8B-B14F-4D97-AF65-F5344CB8AC3E}">
         <p14:creationId xmlns:p14="http://schemas.microsoft.com/office/powerpoint/2010/main" val="961279236"/>
+      </p:ext>
+    </p:extLst>
+  </p:cSld>
+  <p:clrMapOvr>
+    <a:masterClrMapping/>
+  </p:clrMapOvr>
+</p:sld>
+</file>
+
+<file path=ppt/slides/slide3.xml><?xml version="1.0" encoding="utf-8"?>
+<p:sld xmlns:a="http://schemas.openxmlformats.org/drawingml/2006/main" xmlns:r="http://schemas.openxmlformats.org/officeDocument/2006/relationships" xmlns:p="http://schemas.openxmlformats.org/presentationml/2006/main">
+  <p:cSld>
+    <p:spTree>
+      <p:nvGrpSpPr>
+        <p:cNvPr id="1" name=""/>
+        <p:cNvGrpSpPr/>
+        <p:nvPr/>
+      </p:nvGrpSpPr>
+      <p:grpSpPr>
+        <a:xfrm>
+          <a:off x="0" y="0"/>
+          <a:ext cx="0" cy="0"/>
+          <a:chOff x="0" y="0"/>
+          <a:chExt cx="0" cy="0"/>
+        </a:xfrm>
+      </p:grpSpPr>
+      <p:sp>
+        <p:nvSpPr>
+          <p:cNvPr id="5" name="Title 4">
+            <a:extLst>
+              <a:ext uri="{FF2B5EF4-FFF2-40B4-BE49-F238E27FC236}">
+                <a16:creationId xmlns:a16="http://schemas.microsoft.com/office/drawing/2014/main" id="{3A25EF84-C7F0-8246-81EA-0939CCE25077}"/>
+              </a:ext>
+            </a:extLst>
+          </p:cNvPr>
+          <p:cNvSpPr>
+            <a:spLocks noGrp="1"/>
+          </p:cNvSpPr>
+          <p:nvPr>
+            <p:ph type="title"/>
+          </p:nvPr>
+        </p:nvSpPr>
+        <p:spPr/>
+        <p:txBody>
+          <a:bodyPr/>
+          <a:lstStyle/>
+          <a:p>
+            <a:r>
+              <a:rPr lang="en-US" dirty="0"/>
+              <a:t>Acknowledgements</a:t>
+            </a:r>
+          </a:p>
+        </p:txBody>
+      </p:sp>
+      <p:sp>
+        <p:nvSpPr>
+          <p:cNvPr id="6" name="Content Placeholder 5">
+            <a:extLst>
+              <a:ext uri="{FF2B5EF4-FFF2-40B4-BE49-F238E27FC236}">
+                <a16:creationId xmlns:a16="http://schemas.microsoft.com/office/drawing/2014/main" id="{D3B1BB7D-FCB4-524A-BB73-BD44658F64B2}"/>
+              </a:ext>
+            </a:extLst>
+          </p:cNvPr>
+          <p:cNvSpPr>
+            <a:spLocks noGrp="1"/>
+          </p:cNvSpPr>
+          <p:nvPr>
+            <p:ph idx="1"/>
+          </p:nvPr>
+        </p:nvSpPr>
+        <p:spPr/>
+        <p:txBody>
+          <a:bodyPr/>
+          <a:lstStyle/>
+          <a:p>
+            <a:r>
+              <a:rPr lang="en-US" dirty="0"/>
+              <a:t>Ian </a:t>
+            </a:r>
+            <a:r>
+              <a:rPr lang="en-US" dirty="0" err="1"/>
+              <a:t>Goodfellow</a:t>
+            </a:r>
+            <a:r>
+              <a:rPr lang="en-US" dirty="0"/>
+              <a:t> – the legend</a:t>
+            </a:r>
+          </a:p>
+          <a:p>
+            <a:r>
+              <a:rPr lang="en-US" dirty="0"/>
+              <a:t>Ali Zaidi – whose material we “adapted”</a:t>
+            </a:r>
+          </a:p>
+          <a:p>
+            <a:r>
+              <a:rPr lang="en-US" dirty="0" err="1"/>
+              <a:t>Mithun</a:t>
+            </a:r>
+            <a:r>
+              <a:rPr lang="en-US" dirty="0"/>
+              <a:t> Prasad – for even more material</a:t>
+            </a:r>
+          </a:p>
+          <a:p>
+            <a:r>
+              <a:rPr lang="en-US" dirty="0"/>
+              <a:t>James McCaffrey – MSR for the hard-core core NN explanation</a:t>
+            </a:r>
+          </a:p>
+          <a:p>
+            <a:r>
+              <a:rPr lang="en-US" dirty="0" err="1"/>
+              <a:t>Asli</a:t>
+            </a:r>
+            <a:r>
+              <a:rPr lang="en-US" dirty="0"/>
+              <a:t> </a:t>
+            </a:r>
+            <a:r>
+              <a:rPr lang="en-US" dirty="0" err="1"/>
+              <a:t>Celikyilmaz</a:t>
+            </a:r>
+            <a:r>
+              <a:rPr lang="en-US" dirty="0"/>
+              <a:t> – MSR for the GAN explanation</a:t>
+            </a:r>
+          </a:p>
+          <a:p>
+            <a:r>
+              <a:rPr lang="en-US" dirty="0"/>
+              <a:t>… and many more</a:t>
+            </a:r>
+          </a:p>
+          <a:p>
+            <a:endParaRPr lang="en-US" dirty="0"/>
+          </a:p>
+        </p:txBody>
+      </p:sp>
+    </p:spTree>
+    <p:extLst>
+      <p:ext uri="{BB962C8B-B14F-4D97-AF65-F5344CB8AC3E}">
+        <p14:creationId xmlns:p14="http://schemas.microsoft.com/office/powerpoint/2010/main" val="889006159"/>
       </p:ext>
     </p:extLst>
   </p:cSld>

</xml_diff>

<commit_message>
Final commit. Added RL material, fixed typos and made presentation clearer
</commit_message>
<xml_diff>
--- a/day1/Agenda.pptx
+++ b/day1/Agenda.pptx
@@ -261,7 +261,7 @@
           <a:p>
             <a:fld id="{DEC8558D-7E10-584E-BEE2-BF9C0EA4F725}" type="datetimeFigureOut">
               <a:rPr lang="en-US" smtClean="0"/>
-              <a:t>5/13/18</a:t>
+              <a:t>5/18/18</a:t>
             </a:fld>
             <a:endParaRPr lang="en-US"/>
           </a:p>
@@ -459,7 +459,7 @@
           <a:p>
             <a:fld id="{DEC8558D-7E10-584E-BEE2-BF9C0EA4F725}" type="datetimeFigureOut">
               <a:rPr lang="en-US" smtClean="0"/>
-              <a:t>5/13/18</a:t>
+              <a:t>5/18/18</a:t>
             </a:fld>
             <a:endParaRPr lang="en-US"/>
           </a:p>
@@ -667,7 +667,7 @@
           <a:p>
             <a:fld id="{DEC8558D-7E10-584E-BEE2-BF9C0EA4F725}" type="datetimeFigureOut">
               <a:rPr lang="en-US" smtClean="0"/>
-              <a:t>5/13/18</a:t>
+              <a:t>5/18/18</a:t>
             </a:fld>
             <a:endParaRPr lang="en-US"/>
           </a:p>
@@ -865,7 +865,7 @@
           <a:p>
             <a:fld id="{DEC8558D-7E10-584E-BEE2-BF9C0EA4F725}" type="datetimeFigureOut">
               <a:rPr lang="en-US" smtClean="0"/>
-              <a:t>5/13/18</a:t>
+              <a:t>5/18/18</a:t>
             </a:fld>
             <a:endParaRPr lang="en-US"/>
           </a:p>
@@ -1140,7 +1140,7 @@
           <a:p>
             <a:fld id="{DEC8558D-7E10-584E-BEE2-BF9C0EA4F725}" type="datetimeFigureOut">
               <a:rPr lang="en-US" smtClean="0"/>
-              <a:t>5/13/18</a:t>
+              <a:t>5/18/18</a:t>
             </a:fld>
             <a:endParaRPr lang="en-US"/>
           </a:p>
@@ -1405,7 +1405,7 @@
           <a:p>
             <a:fld id="{DEC8558D-7E10-584E-BEE2-BF9C0EA4F725}" type="datetimeFigureOut">
               <a:rPr lang="en-US" smtClean="0"/>
-              <a:t>5/13/18</a:t>
+              <a:t>5/18/18</a:t>
             </a:fld>
             <a:endParaRPr lang="en-US"/>
           </a:p>
@@ -1817,7 +1817,7 @@
           <a:p>
             <a:fld id="{DEC8558D-7E10-584E-BEE2-BF9C0EA4F725}" type="datetimeFigureOut">
               <a:rPr lang="en-US" smtClean="0"/>
-              <a:t>5/13/18</a:t>
+              <a:t>5/18/18</a:t>
             </a:fld>
             <a:endParaRPr lang="en-US"/>
           </a:p>
@@ -1958,7 +1958,7 @@
           <a:p>
             <a:fld id="{DEC8558D-7E10-584E-BEE2-BF9C0EA4F725}" type="datetimeFigureOut">
               <a:rPr lang="en-US" smtClean="0"/>
-              <a:t>5/13/18</a:t>
+              <a:t>5/18/18</a:t>
             </a:fld>
             <a:endParaRPr lang="en-US"/>
           </a:p>
@@ -2071,7 +2071,7 @@
           <a:p>
             <a:fld id="{DEC8558D-7E10-584E-BEE2-BF9C0EA4F725}" type="datetimeFigureOut">
               <a:rPr lang="en-US" smtClean="0"/>
-              <a:t>5/13/18</a:t>
+              <a:t>5/18/18</a:t>
             </a:fld>
             <a:endParaRPr lang="en-US"/>
           </a:p>
@@ -2382,7 +2382,7 @@
           <a:p>
             <a:fld id="{DEC8558D-7E10-584E-BEE2-BF9C0EA4F725}" type="datetimeFigureOut">
               <a:rPr lang="en-US" smtClean="0"/>
-              <a:t>5/13/18</a:t>
+              <a:t>5/18/18</a:t>
             </a:fld>
             <a:endParaRPr lang="en-US"/>
           </a:p>
@@ -2670,7 +2670,7 @@
           <a:p>
             <a:fld id="{DEC8558D-7E10-584E-BEE2-BF9C0EA4F725}" type="datetimeFigureOut">
               <a:rPr lang="en-US" smtClean="0"/>
-              <a:t>5/13/18</a:t>
+              <a:t>5/18/18</a:t>
             </a:fld>
             <a:endParaRPr lang="en-US"/>
           </a:p>
@@ -2911,7 +2911,7 @@
           <a:p>
             <a:fld id="{DEC8558D-7E10-584E-BEE2-BF9C0EA4F725}" type="datetimeFigureOut">
               <a:rPr lang="en-US" smtClean="0"/>
-              <a:t>5/13/18</a:t>
+              <a:t>5/18/18</a:t>
             </a:fld>
             <a:endParaRPr lang="en-US"/>
           </a:p>
@@ -3451,7 +3451,7 @@
           <a:p>
             <a:r>
               <a:rPr lang="en-US" dirty="0"/>
-              <a:t>Agenda - Draft</a:t>
+              <a:t>Agenda</a:t>
             </a:r>
           </a:p>
         </p:txBody>
@@ -3726,58 +3726,48 @@
             <a:pPr lvl="1"/>
             <a:r>
               <a:rPr lang="en-US" sz="2600" dirty="0"/>
-              <a:t>Introduction to cognitive services </a:t>
+              <a:t>Lab 8: Deploying a CNN model to ML cluster</a:t>
             </a:r>
           </a:p>
           <a:p>
             <a:pPr lvl="1"/>
             <a:r>
               <a:rPr lang="en-US" sz="2600" dirty="0"/>
-              <a:t>Other cool topics as time allows, such as:</a:t>
-            </a:r>
-          </a:p>
-          <a:p>
-            <a:pPr lvl="2"/>
-            <a:r>
-              <a:rPr lang="en-US" sz="2200" dirty="0"/>
-              <a:t>Object detection with fast-</a:t>
-            </a:r>
-            <a:r>
-              <a:rPr lang="en-US" sz="2200" dirty="0" err="1"/>
-              <a:t>rcnn</a:t>
-            </a:r>
-            <a:r>
-              <a:rPr lang="en-US" sz="2200" dirty="0"/>
-              <a:t> (lab)</a:t>
-            </a:r>
-          </a:p>
-          <a:p>
-            <a:pPr lvl="2"/>
-            <a:r>
-              <a:rPr lang="en-US" sz="2200" dirty="0"/>
-              <a:t>Generative Antagonistic Networks (lab)</a:t>
-            </a:r>
-          </a:p>
-          <a:p>
-            <a:pPr lvl="2"/>
-            <a:r>
-              <a:rPr lang="en-US" sz="2200" dirty="0"/>
-              <a:t>Recommendation with autoencoders </a:t>
-            </a:r>
-          </a:p>
-          <a:p>
-            <a:pPr lvl="2"/>
-            <a:r>
-              <a:rPr lang="en-US" sz="2200" dirty="0"/>
-              <a:t>Visual search with CNNs and cosine vs. Euclidean distance </a:t>
-            </a:r>
-          </a:p>
-          <a:p>
-            <a:pPr lvl="2"/>
-            <a:r>
-              <a:rPr lang="en-US" sz="2200" dirty="0"/>
-              <a:t>Time series forecasting with RNNs</a:t>
-            </a:r>
+              <a:t>Introduction to Cognitive Services </a:t>
+            </a:r>
+          </a:p>
+          <a:p>
+            <a:pPr lvl="1"/>
+            <a:r>
+              <a:rPr lang="en-US" sz="2600" dirty="0"/>
+              <a:t>Introduction to Generative Adversarial Networks</a:t>
+            </a:r>
+          </a:p>
+          <a:p>
+            <a:pPr lvl="1"/>
+            <a:r>
+              <a:rPr lang="en-US" sz="2600" dirty="0"/>
+              <a:t>Lab9: Build a simple GAN</a:t>
+            </a:r>
+          </a:p>
+          <a:p>
+            <a:pPr lvl="1"/>
+            <a:r>
+              <a:rPr lang="en-US" sz="2600" dirty="0"/>
+              <a:t>Introduction to Reinforcement Learning</a:t>
+            </a:r>
+          </a:p>
+          <a:p>
+            <a:pPr lvl="1"/>
+            <a:r>
+              <a:rPr lang="en-US" sz="2600"/>
+              <a:t>Lab10: </a:t>
+            </a:r>
+            <a:r>
+              <a:rPr lang="en-US" sz="2600" dirty="0"/>
+              <a:t>A simple Q-learning RL model with CNTK</a:t>
+            </a:r>
+            <a:endParaRPr lang="en-US" sz="2200" dirty="0"/>
           </a:p>
           <a:p>
             <a:pPr lvl="1"/>

</xml_diff>

<commit_message>
final final commit -promise!
</commit_message>
<xml_diff>
--- a/day1/Agenda.pptx
+++ b/day1/Agenda.pptx
@@ -3912,6 +3912,21 @@
           </a:p>
           <a:p>
             <a:r>
+              <a:rPr lang="en-US" dirty="0" err="1"/>
+              <a:t>Lihong</a:t>
+            </a:r>
+            <a:r>
+              <a:rPr lang="en-US" dirty="0"/>
+              <a:t> Li for the </a:t>
+            </a:r>
+            <a:r>
+              <a:rPr lang="en-US"/>
+              <a:t>RL introduction</a:t>
+            </a:r>
+            <a:endParaRPr lang="en-US" dirty="0"/>
+          </a:p>
+          <a:p>
+            <a:r>
               <a:rPr lang="en-US" dirty="0"/>
               <a:t>… and many more</a:t>
             </a:r>

</xml_diff>